<commit_message>
Finished off Presentation Slides
</commit_message>
<xml_diff>
--- a/ULTRASOUND DISTANCE DETECTION.pptx
+++ b/ULTRASOUND DISTANCE DETECTION.pptx
@@ -114,6 +114,11 @@
       </a:defRPr>
     </a:lvl9pPr>
   </p:defaultTextStyle>
+  <p:extLst>
+    <p:ext uri="{EFAFB233-063F-42B5-8137-9DF3F51BA10A}">
+      <p15:sldGuideLst xmlns:p15="http://schemas.microsoft.com/office/powerpoint/2012/main"/>
+    </p:ext>
+  </p:extLst>
 </p:presentation>
 </file>
 
@@ -2837,7 +2842,7 @@
             <a:fld id="{B61BEF0D-F0BB-DE4B-95CE-6DB70DBA9567}" type="datetimeFigureOut">
               <a:rPr lang="en-US" dirty="0"/>
               <a:pPr/>
-              <a:t>5/15/2023</a:t>
+              <a:t>5/16/2023</a:t>
             </a:fld>
             <a:endParaRPr lang="en-US" dirty="0"/>
           </a:p>
@@ -3130,7 +3135,7 @@
             <a:fld id="{B61BEF0D-F0BB-DE4B-95CE-6DB70DBA9567}" type="datetimeFigureOut">
               <a:rPr lang="en-US" dirty="0"/>
               <a:pPr/>
-              <a:t>5/15/2023</a:t>
+              <a:t>5/16/2023</a:t>
             </a:fld>
             <a:endParaRPr lang="en-US" dirty="0"/>
           </a:p>
@@ -3375,7 +3380,7 @@
             <a:fld id="{B61BEF0D-F0BB-DE4B-95CE-6DB70DBA9567}" type="datetimeFigureOut">
               <a:rPr lang="en-US" dirty="0"/>
               <a:pPr/>
-              <a:t>5/15/2023</a:t>
+              <a:t>5/16/2023</a:t>
             </a:fld>
             <a:endParaRPr lang="en-US" dirty="0"/>
           </a:p>
@@ -3912,7 +3917,7 @@
             <a:fld id="{B61BEF0D-F0BB-DE4B-95CE-6DB70DBA9567}" type="datetimeFigureOut">
               <a:rPr lang="en-US" dirty="0"/>
               <a:pPr/>
-              <a:t>5/15/2023</a:t>
+              <a:t>5/16/2023</a:t>
             </a:fld>
             <a:endParaRPr lang="en-US" dirty="0"/>
           </a:p>
@@ -4157,7 +4162,7 @@
             <a:fld id="{B61BEF0D-F0BB-DE4B-95CE-6DB70DBA9567}" type="datetimeFigureOut">
               <a:rPr lang="en-US" dirty="0"/>
               <a:pPr/>
-              <a:t>5/15/2023</a:t>
+              <a:t>5/16/2023</a:t>
             </a:fld>
             <a:endParaRPr lang="en-US" dirty="0"/>
           </a:p>
@@ -4686,7 +4691,7 @@
             <a:fld id="{B61BEF0D-F0BB-DE4B-95CE-6DB70DBA9567}" type="datetimeFigureOut">
               <a:rPr lang="en-US" dirty="0"/>
               <a:pPr/>
-              <a:t>5/15/2023</a:t>
+              <a:t>5/16/2023</a:t>
             </a:fld>
             <a:endParaRPr lang="en-US" dirty="0"/>
           </a:p>
@@ -4980,7 +4985,7 @@
             <a:fld id="{B61BEF0D-F0BB-DE4B-95CE-6DB70DBA9567}" type="datetimeFigureOut">
               <a:rPr lang="en-US" dirty="0"/>
               <a:pPr/>
-              <a:t>5/15/2023</a:t>
+              <a:t>5/16/2023</a:t>
             </a:fld>
             <a:endParaRPr lang="en-US" dirty="0"/>
           </a:p>
@@ -5151,7 +5156,7 @@
             <a:fld id="{B61BEF0D-F0BB-DE4B-95CE-6DB70DBA9567}" type="datetimeFigureOut">
               <a:rPr lang="en-US" dirty="0"/>
               <a:pPr/>
-              <a:t>5/15/2023</a:t>
+              <a:t>5/16/2023</a:t>
             </a:fld>
             <a:endParaRPr lang="en-US" dirty="0"/>
           </a:p>
@@ -5328,7 +5333,7 @@
             <a:fld id="{B61BEF0D-F0BB-DE4B-95CE-6DB70DBA9567}" type="datetimeFigureOut">
               <a:rPr lang="en-US" dirty="0"/>
               <a:pPr/>
-              <a:t>5/15/2023</a:t>
+              <a:t>5/16/2023</a:t>
             </a:fld>
             <a:endParaRPr lang="en-US" dirty="0"/>
           </a:p>
@@ -5536,7 +5541,7 @@
             <a:fld id="{B61BEF0D-F0BB-DE4B-95CE-6DB70DBA9567}" type="datetimeFigureOut">
               <a:rPr lang="en-US" dirty="0"/>
               <a:pPr/>
-              <a:t>5/15/2023</a:t>
+              <a:t>5/16/2023</a:t>
             </a:fld>
             <a:endParaRPr lang="en-US" dirty="0"/>
           </a:p>
@@ -5784,7 +5789,7 @@
             <a:fld id="{B61BEF0D-F0BB-DE4B-95CE-6DB70DBA9567}" type="datetimeFigureOut">
               <a:rPr lang="en-US" dirty="0"/>
               <a:pPr/>
-              <a:t>5/15/2023</a:t>
+              <a:t>5/16/2023</a:t>
             </a:fld>
             <a:endParaRPr lang="en-US" dirty="0"/>
           </a:p>
@@ -6128,7 +6133,7 @@
             <a:fld id="{B61BEF0D-F0BB-DE4B-95CE-6DB70DBA9567}" type="datetimeFigureOut">
               <a:rPr lang="en-US" dirty="0"/>
               <a:pPr/>
-              <a:t>5/15/2023</a:t>
+              <a:t>5/16/2023</a:t>
             </a:fld>
             <a:endParaRPr lang="en-US" dirty="0"/>
           </a:p>
@@ -6617,7 +6622,7 @@
             <a:fld id="{B61BEF0D-F0BB-DE4B-95CE-6DB70DBA9567}" type="datetimeFigureOut">
               <a:rPr lang="en-US" dirty="0"/>
               <a:pPr/>
-              <a:t>5/15/2023</a:t>
+              <a:t>5/16/2023</a:t>
             </a:fld>
             <a:endParaRPr lang="en-US" dirty="0"/>
           </a:p>
@@ -6732,7 +6737,7 @@
             <a:fld id="{B61BEF0D-F0BB-DE4B-95CE-6DB70DBA9567}" type="datetimeFigureOut">
               <a:rPr lang="en-US" dirty="0"/>
               <a:pPr/>
-              <a:t>5/15/2023</a:t>
+              <a:t>5/16/2023</a:t>
             </a:fld>
             <a:endParaRPr lang="en-US" dirty="0"/>
           </a:p>
@@ -6824,7 +6829,7 @@
             <a:fld id="{B61BEF0D-F0BB-DE4B-95CE-6DB70DBA9567}" type="datetimeFigureOut">
               <a:rPr lang="en-US" dirty="0"/>
               <a:pPr/>
-              <a:t>5/15/2023</a:t>
+              <a:t>5/16/2023</a:t>
             </a:fld>
             <a:endParaRPr lang="en-US" dirty="0"/>
           </a:p>
@@ -7104,7 +7109,7 @@
             <a:fld id="{B61BEF0D-F0BB-DE4B-95CE-6DB70DBA9567}" type="datetimeFigureOut">
               <a:rPr lang="en-US" dirty="0"/>
               <a:pPr/>
-              <a:t>5/15/2023</a:t>
+              <a:t>5/16/2023</a:t>
             </a:fld>
             <a:endParaRPr lang="en-US" dirty="0"/>
           </a:p>
@@ -7392,7 +7397,7 @@
             <a:fld id="{B61BEF0D-F0BB-DE4B-95CE-6DB70DBA9567}" type="datetimeFigureOut">
               <a:rPr lang="en-US" dirty="0"/>
               <a:pPr/>
-              <a:t>5/15/2023</a:t>
+              <a:t>5/16/2023</a:t>
             </a:fld>
             <a:endParaRPr lang="en-US" dirty="0"/>
           </a:p>
@@ -7919,7 +7924,7 @@
             <a:fld id="{B61BEF0D-F0BB-DE4B-95CE-6DB70DBA9567}" type="datetimeFigureOut">
               <a:rPr lang="en-US" dirty="0"/>
               <a:pPr/>
-              <a:t>5/15/2023</a:t>
+              <a:t>5/16/2023</a:t>
             </a:fld>
             <a:endParaRPr lang="en-US" dirty="0"/>
           </a:p>
@@ -8538,6 +8543,49 @@
           <a:chExt cx="0" cy="0"/>
         </a:xfrm>
       </p:grpSpPr>
+      <p:pic>
+        <p:nvPicPr>
+          <p:cNvPr id="4" name="Content Placeholder 3" descr="PROJECT MANAGEMENT GANTT CHART TEMPLATE &#10;PROJECT NAME &#10;UUrasound Distance Detecfion on Moving Objects &#10;PROJECT START DATE &#10;28th June 2022 &#10;TASK TITLE &#10;Project &#10;Research &#10;Deliverable I &#10;Deliverable 2 &#10;Deliverable 3 &#10;Deliverable 4 &#10;Deliverable 5 &#10;Deliverable 6 &#10;PROJECT END DATE &#10;16th May 2023 &#10;TASK DESCRIPTION &#10;RESE.2RCH &#10;ODAY'S DATE &#10;28th June 2022 &#10;1.0 &#10;1.1 &#10;12 &#10;1.3 &#10;1.5 &#10;16 &#10;1.7 &#10;28&quot; June2022 &#10;Summer 2022 &#10;T o create a system which be able to transmit &#10;an ulfiasound Signal toward an object and then &#10;receive Signal once it has been reflected off &#10;of this 0b •ect &#10;This system will then be able to accurately &#10;measure the distance of this object when It is &#10;stationari and duplav the distance on a &#10;computer tenninal &#10;This system will then be able to accurately &#10;measure the distance of this object when It is &#10;moving and display die distance on a &#10;c uter tenninal. &#10;This system will look at utllising ultrasound &#10;transducers which transmit different frequencies &#10;and using arrays of frangducers to Increase &#10;the accuracy of the device at greater distances &#10;and faster speeds &#10;A temperature sensor mill be used to see whether &#10;temperature will noticeably affect the &#10;propagation speed of ultrasound waves through &#10;air and if so code mill be added to counteract this &#10;The distance measured by the device Will be &#10;displayed on an LCD screen &#10;Individual columns represent weeks &#10;12 12 12 12 &#10;16th May 20223 &#10;16th &#10;16th D ec:ember &#10;February &#10;16th March 2023 &#10;31Apri12023 &#10;_A_____L___L____L___ &#10;31Apri12023 &#10;31st March 2023 ">
+            <a:extLst>
+              <a:ext uri="{FF2B5EF4-FFF2-40B4-BE49-F238E27FC236}">
+                <a16:creationId xmlns:a16="http://schemas.microsoft.com/office/drawing/2014/main" id="{38F5AA7E-B8CD-88AA-DAD1-E9084F286429}"/>
+              </a:ext>
+            </a:extLst>
+          </p:cNvPr>
+          <p:cNvPicPr>
+            <a:picLocks noGrp="1" noChangeAspect="1"/>
+          </p:cNvPicPr>
+          <p:nvPr>
+            <p:ph idx="1"/>
+          </p:nvPr>
+        </p:nvPicPr>
+        <p:blipFill>
+          <a:blip r:embed="rId2">
+            <a:extLst>
+              <a:ext uri="{28A0092B-C50C-407E-A947-70E740481C1C}">
+                <a14:useLocalDpi xmlns:a14="http://schemas.microsoft.com/office/drawing/2010/main" val="0"/>
+              </a:ext>
+            </a:extLst>
+          </a:blip>
+          <a:srcRect/>
+          <a:stretch>
+            <a:fillRect/>
+          </a:stretch>
+        </p:blipFill>
+        <p:spPr bwMode="auto">
+          <a:xfrm>
+            <a:off x="0" y="1166495"/>
+            <a:ext cx="5930009" cy="3253107"/>
+          </a:xfrm>
+          <a:prstGeom prst="rect">
+            <a:avLst/>
+          </a:prstGeom>
+          <a:noFill/>
+          <a:ln>
+            <a:noFill/>
+          </a:ln>
+        </p:spPr>
+      </p:pic>
       <p:sp>
         <p:nvSpPr>
           <p:cNvPr id="2" name="Title 1">
@@ -8569,31 +8617,36 @@
           </a:p>
         </p:txBody>
       </p:sp>
-      <p:sp>
-        <p:nvSpPr>
-          <p:cNvPr id="3" name="Content Placeholder 2">
+      <p:pic>
+        <p:nvPicPr>
+          <p:cNvPr id="5" name="Picture 4" descr="A screenshot of a computer&#10;&#10;Description automatically generated with medium confidence">
             <a:extLst>
               <a:ext uri="{FF2B5EF4-FFF2-40B4-BE49-F238E27FC236}">
-                <a16:creationId xmlns:a16="http://schemas.microsoft.com/office/drawing/2014/main" id="{FA5D9F61-3A45-4430-8D95-E1E58294E5C1}"/>
+                <a16:creationId xmlns:a16="http://schemas.microsoft.com/office/drawing/2014/main" id="{52D596C8-18BC-53C5-7E44-1DB86F495B0E}"/>
               </a:ext>
             </a:extLst>
           </p:cNvPr>
-          <p:cNvSpPr>
-            <a:spLocks noGrp="1"/>
-          </p:cNvSpPr>
-          <p:nvPr>
-            <p:ph idx="1"/>
-          </p:nvPr>
-        </p:nvSpPr>
-        <p:spPr/>
-        <p:txBody>
-          <a:bodyPr/>
-          <a:lstStyle/>
-          <a:p>
-            <a:endParaRPr lang="en-GB"/>
-          </a:p>
-        </p:txBody>
-      </p:sp>
+          <p:cNvPicPr>
+            <a:picLocks noChangeAspect="1"/>
+          </p:cNvPicPr>
+          <p:nvPr/>
+        </p:nvPicPr>
+        <p:blipFill>
+          <a:blip r:embed="rId3"/>
+          <a:stretch>
+            <a:fillRect/>
+          </a:stretch>
+        </p:blipFill>
+        <p:spPr>
+          <a:xfrm>
+            <a:off x="6096000" y="2714068"/>
+            <a:ext cx="5988685" cy="3799840"/>
+          </a:xfrm>
+          <a:prstGeom prst="rect">
+            <a:avLst/>
+          </a:prstGeom>
+        </p:spPr>
+      </p:pic>
     </p:spTree>
     <p:extLst>
       <p:ext uri="{BB962C8B-B14F-4D97-AF65-F5344CB8AC3E}">
@@ -8610,6 +8663,14 @@
 <file path=ppt/slides/slide11.xml><?xml version="1.0" encoding="utf-8"?>
 <p:sld xmlns:a="http://schemas.openxmlformats.org/drawingml/2006/main" xmlns:r="http://schemas.openxmlformats.org/officeDocument/2006/relationships" xmlns:p="http://schemas.openxmlformats.org/presentationml/2006/main">
   <p:cSld>
+    <p:bg>
+      <p:bgPr>
+        <a:solidFill>
+          <a:schemeClr val="bg1"/>
+        </a:solidFill>
+        <a:effectLst/>
+      </p:bgPr>
+    </p:bg>
     <p:spTree>
       <p:nvGrpSpPr>
         <p:cNvPr id="1" name=""/>
@@ -8624,6 +8685,517 @@
           <a:chExt cx="0" cy="0"/>
         </a:xfrm>
       </p:grpSpPr>
+      <p:grpSp>
+        <p:nvGrpSpPr>
+          <p:cNvPr id="9" name="Group 8">
+            <a:extLst>
+              <a:ext uri="{FF2B5EF4-FFF2-40B4-BE49-F238E27FC236}">
+                <a16:creationId xmlns:a16="http://schemas.microsoft.com/office/drawing/2014/main" id="{D6BA167A-D3C3-4EE8-8B5E-13679208725E}"/>
+              </a:ext>
+              <a:ext uri="{C183D7F6-B498-43B3-948B-1728B52AA6E4}">
+                <adec:decorative xmlns:adec="http://schemas.microsoft.com/office/drawing/2017/decorative" val="1"/>
+              </a:ext>
+            </a:extLst>
+          </p:cNvPr>
+          <p:cNvGrpSpPr>
+            <a:grpSpLocks noGrp="1" noUngrp="1" noRot="1" noChangeAspect="1" noMove="1" noResize="1"/>
+          </p:cNvGrpSpPr>
+          <p:nvPr>
+            <p:extLst>
+              <p:ext uri="{386F3935-93C4-4BCD-93E2-E3B085C9AB24}">
+                <p16:designElem xmlns:p16="http://schemas.microsoft.com/office/powerpoint/2015/main" val="1"/>
+              </p:ext>
+            </p:extLst>
+          </p:nvPr>
+        </p:nvGrpSpPr>
+        <p:grpSpPr>
+          <a:xfrm>
+            <a:off x="546100" y="-4763"/>
+            <a:ext cx="5014912" cy="6862763"/>
+            <a:chOff x="2928938" y="-4763"/>
+            <a:chExt cx="5014912" cy="6862763"/>
+          </a:xfrm>
+        </p:grpSpPr>
+        <p:sp>
+          <p:nvSpPr>
+            <p:cNvPr id="10" name="Freeform 6">
+              <a:extLst>
+                <a:ext uri="{FF2B5EF4-FFF2-40B4-BE49-F238E27FC236}">
+                  <a16:creationId xmlns:a16="http://schemas.microsoft.com/office/drawing/2014/main" id="{810CA83B-630E-45DB-ADCB-F0260428513D}"/>
+                </a:ext>
+                <a:ext uri="{C183D7F6-B498-43B3-948B-1728B52AA6E4}">
+                  <adec:decorative xmlns:adec="http://schemas.microsoft.com/office/drawing/2017/decorative" val="1"/>
+                </a:ext>
+              </a:extLst>
+            </p:cNvPr>
+            <p:cNvSpPr/>
+            <p:nvPr>
+              <p:extLst>
+                <p:ext uri="{386F3935-93C4-4BCD-93E2-E3B085C9AB24}">
+                  <p16:designElem xmlns:p16="http://schemas.microsoft.com/office/powerpoint/2015/main" val="1"/>
+                </p:ext>
+              </p:extLst>
+            </p:nvPr>
+          </p:nvSpPr>
+          <p:spPr bwMode="auto">
+            <a:xfrm>
+              <a:off x="3367088" y="-4763"/>
+              <a:ext cx="1063625" cy="2782888"/>
+            </a:xfrm>
+            <a:custGeom>
+              <a:avLst/>
+              <a:gdLst/>
+              <a:ahLst/>
+              <a:cxnLst/>
+              <a:rect l="0" t="0" r="r" b="b"/>
+              <a:pathLst>
+                <a:path w="670" h="1753">
+                  <a:moveTo>
+                    <a:pt x="0" y="1696"/>
+                  </a:moveTo>
+                  <a:lnTo>
+                    <a:pt x="225" y="1753"/>
+                  </a:lnTo>
+                  <a:lnTo>
+                    <a:pt x="670" y="0"/>
+                  </a:lnTo>
+                  <a:lnTo>
+                    <a:pt x="430" y="0"/>
+                  </a:lnTo>
+                  <a:lnTo>
+                    <a:pt x="0" y="1696"/>
+                  </a:lnTo>
+                  <a:close/>
+                </a:path>
+              </a:pathLst>
+            </a:custGeom>
+            <a:solidFill>
+              <a:schemeClr val="accent1"/>
+            </a:solidFill>
+            <a:ln>
+              <a:noFill/>
+            </a:ln>
+          </p:spPr>
+        </p:sp>
+        <p:sp>
+          <p:nvSpPr>
+            <p:cNvPr id="11" name="Freeform 7">
+              <a:extLst>
+                <a:ext uri="{FF2B5EF4-FFF2-40B4-BE49-F238E27FC236}">
+                  <a16:creationId xmlns:a16="http://schemas.microsoft.com/office/drawing/2014/main" id="{7A57B554-6973-429A-818B-524C03DA479E}"/>
+                </a:ext>
+                <a:ext uri="{C183D7F6-B498-43B3-948B-1728B52AA6E4}">
+                  <adec:decorative xmlns:adec="http://schemas.microsoft.com/office/drawing/2017/decorative" val="1"/>
+                </a:ext>
+              </a:extLst>
+            </p:cNvPr>
+            <p:cNvSpPr/>
+            <p:nvPr>
+              <p:extLst>
+                <p:ext uri="{386F3935-93C4-4BCD-93E2-E3B085C9AB24}">
+                  <p16:designElem xmlns:p16="http://schemas.microsoft.com/office/powerpoint/2015/main" val="1"/>
+                </p:ext>
+              </p:extLst>
+            </p:nvPr>
+          </p:nvSpPr>
+          <p:spPr bwMode="auto">
+            <a:xfrm>
+              <a:off x="2928938" y="-4763"/>
+              <a:ext cx="1035050" cy="2673350"/>
+            </a:xfrm>
+            <a:custGeom>
+              <a:avLst/>
+              <a:gdLst/>
+              <a:ahLst/>
+              <a:cxnLst/>
+              <a:rect l="0" t="0" r="r" b="b"/>
+              <a:pathLst>
+                <a:path w="652" h="1684">
+                  <a:moveTo>
+                    <a:pt x="225" y="1684"/>
+                  </a:moveTo>
+                  <a:lnTo>
+                    <a:pt x="652" y="0"/>
+                  </a:lnTo>
+                  <a:lnTo>
+                    <a:pt x="411" y="0"/>
+                  </a:lnTo>
+                  <a:lnTo>
+                    <a:pt x="0" y="1627"/>
+                  </a:lnTo>
+                  <a:lnTo>
+                    <a:pt x="219" y="1681"/>
+                  </a:lnTo>
+                  <a:lnTo>
+                    <a:pt x="225" y="1684"/>
+                  </a:lnTo>
+                  <a:close/>
+                </a:path>
+              </a:pathLst>
+            </a:custGeom>
+            <a:solidFill>
+              <a:schemeClr val="tx1">
+                <a:lumMod val="65000"/>
+                <a:lumOff val="35000"/>
+              </a:schemeClr>
+            </a:solidFill>
+            <a:ln>
+              <a:noFill/>
+            </a:ln>
+          </p:spPr>
+        </p:sp>
+        <p:sp>
+          <p:nvSpPr>
+            <p:cNvPr id="12" name="Freeform 9">
+              <a:extLst>
+                <a:ext uri="{FF2B5EF4-FFF2-40B4-BE49-F238E27FC236}">
+                  <a16:creationId xmlns:a16="http://schemas.microsoft.com/office/drawing/2014/main" id="{89ED2DB2-F3BB-4B5E-84E6-CC259E394AF3}"/>
+                </a:ext>
+                <a:ext uri="{C183D7F6-B498-43B3-948B-1728B52AA6E4}">
+                  <adec:decorative xmlns:adec="http://schemas.microsoft.com/office/drawing/2017/decorative" val="1"/>
+                </a:ext>
+              </a:extLst>
+            </p:cNvPr>
+            <p:cNvSpPr/>
+            <p:nvPr>
+              <p:extLst>
+                <p:ext uri="{386F3935-93C4-4BCD-93E2-E3B085C9AB24}">
+                  <p16:designElem xmlns:p16="http://schemas.microsoft.com/office/powerpoint/2015/main" val="1"/>
+                </p:ext>
+              </p:extLst>
+            </p:nvPr>
+          </p:nvSpPr>
+          <p:spPr bwMode="auto">
+            <a:xfrm>
+              <a:off x="2928938" y="2582862"/>
+              <a:ext cx="2693987" cy="4275138"/>
+            </a:xfrm>
+            <a:custGeom>
+              <a:avLst/>
+              <a:gdLst/>
+              <a:ahLst/>
+              <a:cxnLst/>
+              <a:rect l="0" t="0" r="r" b="b"/>
+              <a:pathLst>
+                <a:path w="1697" h="2693">
+                  <a:moveTo>
+                    <a:pt x="0" y="0"/>
+                  </a:moveTo>
+                  <a:lnTo>
+                    <a:pt x="1622" y="2693"/>
+                  </a:lnTo>
+                  <a:lnTo>
+                    <a:pt x="1697" y="2693"/>
+                  </a:lnTo>
+                  <a:lnTo>
+                    <a:pt x="0" y="0"/>
+                  </a:lnTo>
+                  <a:close/>
+                </a:path>
+              </a:pathLst>
+            </a:custGeom>
+            <a:solidFill>
+              <a:schemeClr val="tx1">
+                <a:lumMod val="85000"/>
+                <a:lumOff val="15000"/>
+              </a:schemeClr>
+            </a:solidFill>
+            <a:ln>
+              <a:noFill/>
+            </a:ln>
+          </p:spPr>
+        </p:sp>
+        <p:sp>
+          <p:nvSpPr>
+            <p:cNvPr id="13" name="Freeform 10">
+              <a:extLst>
+                <a:ext uri="{FF2B5EF4-FFF2-40B4-BE49-F238E27FC236}">
+                  <a16:creationId xmlns:a16="http://schemas.microsoft.com/office/drawing/2014/main" id="{93816493-5723-43CF-95A9-2CDEC9B11D76}"/>
+                </a:ext>
+                <a:ext uri="{C183D7F6-B498-43B3-948B-1728B52AA6E4}">
+                  <adec:decorative xmlns:adec="http://schemas.microsoft.com/office/drawing/2017/decorative" val="1"/>
+                </a:ext>
+              </a:extLst>
+            </p:cNvPr>
+            <p:cNvSpPr/>
+            <p:nvPr>
+              <p:extLst>
+                <p:ext uri="{386F3935-93C4-4BCD-93E2-E3B085C9AB24}">
+                  <p16:designElem xmlns:p16="http://schemas.microsoft.com/office/powerpoint/2015/main" val="1"/>
+                </p:ext>
+              </p:extLst>
+            </p:nvPr>
+          </p:nvSpPr>
+          <p:spPr bwMode="auto">
+            <a:xfrm>
+              <a:off x="3371850" y="2692400"/>
+              <a:ext cx="3332162" cy="4165600"/>
+            </a:xfrm>
+            <a:custGeom>
+              <a:avLst/>
+              <a:gdLst/>
+              <a:ahLst/>
+              <a:cxnLst/>
+              <a:rect l="0" t="0" r="r" b="b"/>
+              <a:pathLst>
+                <a:path w="2099" h="2624">
+                  <a:moveTo>
+                    <a:pt x="2099" y="2624"/>
+                  </a:moveTo>
+                  <a:lnTo>
+                    <a:pt x="0" y="0"/>
+                  </a:lnTo>
+                  <a:lnTo>
+                    <a:pt x="2021" y="2624"/>
+                  </a:lnTo>
+                  <a:lnTo>
+                    <a:pt x="2099" y="2624"/>
+                  </a:lnTo>
+                  <a:close/>
+                </a:path>
+              </a:pathLst>
+            </a:custGeom>
+            <a:solidFill>
+              <a:schemeClr val="accent1">
+                <a:lumMod val="50000"/>
+              </a:schemeClr>
+            </a:solidFill>
+            <a:ln>
+              <a:noFill/>
+            </a:ln>
+          </p:spPr>
+        </p:sp>
+        <p:sp>
+          <p:nvSpPr>
+            <p:cNvPr id="14" name="Freeform 11">
+              <a:extLst>
+                <a:ext uri="{FF2B5EF4-FFF2-40B4-BE49-F238E27FC236}">
+                  <a16:creationId xmlns:a16="http://schemas.microsoft.com/office/drawing/2014/main" id="{A9964935-0316-4743-BD2E-35B86AF480C4}"/>
+                </a:ext>
+                <a:ext uri="{C183D7F6-B498-43B3-948B-1728B52AA6E4}">
+                  <adec:decorative xmlns:adec="http://schemas.microsoft.com/office/drawing/2017/decorative" val="1"/>
+                </a:ext>
+              </a:extLst>
+            </p:cNvPr>
+            <p:cNvSpPr/>
+            <p:nvPr>
+              <p:extLst>
+                <p:ext uri="{386F3935-93C4-4BCD-93E2-E3B085C9AB24}">
+                  <p16:designElem xmlns:p16="http://schemas.microsoft.com/office/powerpoint/2015/main" val="1"/>
+                </p:ext>
+              </p:extLst>
+            </p:nvPr>
+          </p:nvSpPr>
+          <p:spPr bwMode="auto">
+            <a:xfrm>
+              <a:off x="3367088" y="2687637"/>
+              <a:ext cx="4576762" cy="4170363"/>
+            </a:xfrm>
+            <a:custGeom>
+              <a:avLst/>
+              <a:gdLst/>
+              <a:ahLst/>
+              <a:cxnLst/>
+              <a:rect l="0" t="0" r="r" b="b"/>
+              <a:pathLst>
+                <a:path w="2883" h="2627">
+                  <a:moveTo>
+                    <a:pt x="0" y="0"/>
+                  </a:moveTo>
+                  <a:lnTo>
+                    <a:pt x="3" y="3"/>
+                  </a:lnTo>
+                  <a:lnTo>
+                    <a:pt x="2102" y="2627"/>
+                  </a:lnTo>
+                  <a:lnTo>
+                    <a:pt x="2883" y="2627"/>
+                  </a:lnTo>
+                  <a:lnTo>
+                    <a:pt x="225" y="57"/>
+                  </a:lnTo>
+                  <a:lnTo>
+                    <a:pt x="0" y="0"/>
+                  </a:lnTo>
+                  <a:close/>
+                </a:path>
+              </a:pathLst>
+            </a:custGeom>
+            <a:solidFill>
+              <a:schemeClr val="accent1">
+                <a:lumMod val="75000"/>
+              </a:schemeClr>
+            </a:solidFill>
+            <a:ln>
+              <a:noFill/>
+            </a:ln>
+          </p:spPr>
+        </p:sp>
+        <p:sp>
+          <p:nvSpPr>
+            <p:cNvPr id="15" name="Freeform 12">
+              <a:extLst>
+                <a:ext uri="{FF2B5EF4-FFF2-40B4-BE49-F238E27FC236}">
+                  <a16:creationId xmlns:a16="http://schemas.microsoft.com/office/drawing/2014/main" id="{2B20A700-1547-48D5-AA6F-C1473539C70F}"/>
+                </a:ext>
+                <a:ext uri="{C183D7F6-B498-43B3-948B-1728B52AA6E4}">
+                  <adec:decorative xmlns:adec="http://schemas.microsoft.com/office/drawing/2017/decorative" val="1"/>
+                </a:ext>
+              </a:extLst>
+            </p:cNvPr>
+            <p:cNvSpPr/>
+            <p:nvPr>
+              <p:extLst>
+                <p:ext uri="{386F3935-93C4-4BCD-93E2-E3B085C9AB24}">
+                  <p16:designElem xmlns:p16="http://schemas.microsoft.com/office/powerpoint/2015/main" val="1"/>
+                </p:ext>
+              </p:extLst>
+            </p:nvPr>
+          </p:nvSpPr>
+          <p:spPr bwMode="auto">
+            <a:xfrm>
+              <a:off x="2928938" y="2578100"/>
+              <a:ext cx="3584575" cy="4279900"/>
+            </a:xfrm>
+            <a:custGeom>
+              <a:avLst/>
+              <a:gdLst/>
+              <a:ahLst/>
+              <a:cxnLst/>
+              <a:rect l="0" t="0" r="r" b="b"/>
+              <a:pathLst>
+                <a:path w="2258" h="2696">
+                  <a:moveTo>
+                    <a:pt x="2258" y="2696"/>
+                  </a:moveTo>
+                  <a:lnTo>
+                    <a:pt x="264" y="111"/>
+                  </a:lnTo>
+                  <a:lnTo>
+                    <a:pt x="228" y="60"/>
+                  </a:lnTo>
+                  <a:lnTo>
+                    <a:pt x="225" y="57"/>
+                  </a:lnTo>
+                  <a:lnTo>
+                    <a:pt x="0" y="0"/>
+                  </a:lnTo>
+                  <a:lnTo>
+                    <a:pt x="0" y="3"/>
+                  </a:lnTo>
+                  <a:lnTo>
+                    <a:pt x="1697" y="2696"/>
+                  </a:lnTo>
+                  <a:lnTo>
+                    <a:pt x="2258" y="2696"/>
+                  </a:lnTo>
+                  <a:close/>
+                </a:path>
+              </a:pathLst>
+            </a:custGeom>
+            <a:solidFill>
+              <a:schemeClr val="tx1">
+                <a:lumMod val="75000"/>
+                <a:lumOff val="25000"/>
+              </a:schemeClr>
+            </a:solidFill>
+            <a:ln>
+              <a:noFill/>
+            </a:ln>
+          </p:spPr>
+        </p:sp>
+      </p:grpSp>
+      <p:sp useBgFill="1">
+        <p:nvSpPr>
+          <p:cNvPr id="17" name="Rectangle 16">
+            <a:extLst>
+              <a:ext uri="{FF2B5EF4-FFF2-40B4-BE49-F238E27FC236}">
+                <a16:creationId xmlns:a16="http://schemas.microsoft.com/office/drawing/2014/main" id="{F64080D6-34DE-4277-97CC-2FB3812846DA}"/>
+              </a:ext>
+              <a:ext uri="{C183D7F6-B498-43B3-948B-1728B52AA6E4}">
+                <adec:decorative xmlns:adec="http://schemas.microsoft.com/office/drawing/2017/decorative" val="1"/>
+              </a:ext>
+            </a:extLst>
+          </p:cNvPr>
+          <p:cNvSpPr>
+            <a:spLocks noGrp="1" noRot="1" noChangeAspect="1" noMove="1" noResize="1" noEditPoints="1" noAdjustHandles="1" noChangeArrowheads="1" noChangeShapeType="1" noTextEdit="1"/>
+          </p:cNvSpPr>
+          <p:nvPr>
+            <p:extLst>
+              <p:ext uri="{386F3935-93C4-4BCD-93E2-E3B085C9AB24}">
+                <p16:designElem xmlns:p16="http://schemas.microsoft.com/office/powerpoint/2015/main" val="1"/>
+              </p:ext>
+            </p:extLst>
+          </p:nvPr>
+        </p:nvSpPr>
+        <p:spPr>
+          <a:xfrm>
+            <a:off x="0" y="0"/>
+            <a:ext cx="12192000" cy="6858000"/>
+          </a:xfrm>
+          <a:prstGeom prst="rect">
+            <a:avLst/>
+          </a:prstGeom>
+          <a:ln>
+            <a:noFill/>
+          </a:ln>
+        </p:spPr>
+        <p:style>
+          <a:lnRef idx="2">
+            <a:schemeClr val="accent1">
+              <a:shade val="50000"/>
+            </a:schemeClr>
+          </a:lnRef>
+          <a:fillRef idx="1">
+            <a:schemeClr val="accent1"/>
+          </a:fillRef>
+          <a:effectRef idx="0">
+            <a:schemeClr val="accent1"/>
+          </a:effectRef>
+          <a:fontRef idx="minor">
+            <a:schemeClr val="lt1"/>
+          </a:fontRef>
+        </p:style>
+        <p:txBody>
+          <a:bodyPr rtlCol="0" anchor="ctr"/>
+          <a:lstStyle/>
+          <a:p>
+            <a:pPr algn="ctr"/>
+            <a:endParaRPr lang="en-US"/>
+          </a:p>
+        </p:txBody>
+      </p:sp>
+      <p:pic>
+        <p:nvPicPr>
+          <p:cNvPr id="5" name="Picture 4" descr="Different coloured question marks">
+            <a:extLst>
+              <a:ext uri="{FF2B5EF4-FFF2-40B4-BE49-F238E27FC236}">
+                <a16:creationId xmlns:a16="http://schemas.microsoft.com/office/drawing/2014/main" id="{F03B47B6-2D89-C7E8-406E-63337748138A}"/>
+              </a:ext>
+            </a:extLst>
+          </p:cNvPr>
+          <p:cNvPicPr>
+            <a:picLocks noChangeAspect="1"/>
+          </p:cNvPicPr>
+          <p:nvPr/>
+        </p:nvPicPr>
+        <p:blipFill rotWithShape="1">
+          <a:blip r:embed="rId2">
+            <a:alphaModFix amt="40000"/>
+          </a:blip>
+          <a:srcRect/>
+          <a:stretch/>
+        </p:blipFill>
+        <p:spPr>
+          <a:xfrm>
+            <a:off x="20" y="10"/>
+            <a:ext cx="12191980" cy="6857990"/>
+          </a:xfrm>
+          <a:prstGeom prst="rect">
+            <a:avLst/>
+          </a:prstGeom>
+        </p:spPr>
+      </p:pic>
       <p:sp>
         <p:nvSpPr>
           <p:cNvPr id="2" name="Title 1">
@@ -8642,46 +9214,21 @@
         </p:nvSpPr>
         <p:spPr>
           <a:xfrm>
-            <a:off x="1484310" y="914400"/>
-            <a:ext cx="10018713" cy="1752599"/>
+            <a:off x="2928401" y="1380068"/>
+            <a:ext cx="8574622" cy="2616199"/>
           </a:xfrm>
         </p:spPr>
         <p:txBody>
-          <a:bodyPr/>
+          <a:bodyPr vert="horz" lIns="91440" tIns="45720" rIns="91440" bIns="45720" rtlCol="0" anchor="b">
+            <a:normAutofit/>
+          </a:bodyPr>
           <a:lstStyle/>
           <a:p>
+            <a:pPr algn="r"/>
             <a:r>
-              <a:rPr lang="en-GB" dirty="0">
-                <a:latin typeface="Times New Roman" panose="02020603050405020304" pitchFamily="18" charset="0"/>
-                <a:cs typeface="Times New Roman" panose="02020603050405020304" pitchFamily="18" charset="0"/>
-              </a:rPr>
+              <a:rPr lang="en-US" sz="6000"/>
               <a:t>Thank You, Any Questions?</a:t>
             </a:r>
-          </a:p>
-        </p:txBody>
-      </p:sp>
-      <p:sp>
-        <p:nvSpPr>
-          <p:cNvPr id="3" name="Content Placeholder 2">
-            <a:extLst>
-              <a:ext uri="{FF2B5EF4-FFF2-40B4-BE49-F238E27FC236}">
-                <a16:creationId xmlns:a16="http://schemas.microsoft.com/office/drawing/2014/main" id="{FCAEDB39-F7FB-435C-BE85-700D9EC07B3C}"/>
-              </a:ext>
-            </a:extLst>
-          </p:cNvPr>
-          <p:cNvSpPr>
-            <a:spLocks noGrp="1"/>
-          </p:cNvSpPr>
-          <p:nvPr>
-            <p:ph idx="1"/>
-          </p:nvPr>
-        </p:nvSpPr>
-        <p:spPr/>
-        <p:txBody>
-          <a:bodyPr/>
-          <a:lstStyle/>
-          <a:p>
-            <a:endParaRPr lang="en-GB"/>
           </a:p>
         </p:txBody>
       </p:sp>
@@ -8693,7 +9240,7 @@
     </p:extLst>
   </p:cSld>
   <p:clrMapOvr>
-    <a:masterClrMapping/>
+    <a:overrideClrMapping bg1="dk1" tx1="lt1" bg2="dk2" tx2="lt2" accent1="accent1" accent2="accent2" accent3="accent3" accent4="accent4" accent5="accent5" accent6="accent6" hlink="hlink" folHlink="folHlink"/>
   </p:clrMapOvr>
 </p:sld>
 </file>
@@ -9214,10 +9761,10 @@
       </p:pic>
       <p:pic>
         <p:nvPicPr>
-          <p:cNvPr id="2052" name="Picture 4">
+          <p:cNvPr id="2054" name="Picture 6" descr="Level &#10;10 &#10;30 &#10;Auto &#10;One-Shot &#10;Cursors &#10;Source &#10;Source &#10;Position &#10;11-721-731-7 &#10;Channel A &#10;Position &#10;GND &#10;OFF &#10;Invert &#10;Channel B &#10;Position &#10;10 &#10;GND &#10;OFF &#10;Invert &#10;Channel C &#10;Position &#10;GND &#10;OFF &#10;Invert &#10;Channel D &#10;Position &#10;GND &#10;OFF &#10;Invert &#10;ms 0.27m &#10;MS ">
             <a:extLst>
               <a:ext uri="{FF2B5EF4-FFF2-40B4-BE49-F238E27FC236}">
-                <a16:creationId xmlns:a16="http://schemas.microsoft.com/office/drawing/2014/main" id="{0C2D99F3-703B-459E-B17C-D9FF1BF94809}"/>
+                <a16:creationId xmlns:a16="http://schemas.microsoft.com/office/drawing/2014/main" id="{37864A42-31F6-4BC6-B67F-DF59E0AC20B2}"/>
               </a:ext>
             </a:extLst>
           </p:cNvPr>
@@ -9241,8 +9788,8 @@
         </p:blipFill>
         <p:spPr bwMode="auto">
           <a:xfrm>
-            <a:off x="3514988" y="1382133"/>
-            <a:ext cx="4739779" cy="2841135"/>
+            <a:off x="3281558" y="4149751"/>
+            <a:ext cx="4676309" cy="2858759"/>
           </a:xfrm>
           <a:prstGeom prst="rect">
             <a:avLst/>
@@ -9261,10 +9808,10 @@
       </p:pic>
       <p:pic>
         <p:nvPicPr>
-          <p:cNvPr id="2054" name="Picture 6" descr="Level &#10;10 &#10;30 &#10;Auto &#10;One-Shot &#10;Cursors &#10;Source &#10;Source &#10;Position &#10;11-721-731-7 &#10;Channel A &#10;Position &#10;GND &#10;OFF &#10;Invert &#10;Channel B &#10;Position &#10;10 &#10;GND &#10;OFF &#10;Invert &#10;Channel C &#10;Position &#10;GND &#10;OFF &#10;Invert &#10;Channel D &#10;Position &#10;GND &#10;OFF &#10;Invert &#10;ms 0.27m &#10;MS ">
+          <p:cNvPr id="1026" name="Picture 2" descr="Function Generator &#10;Output &#10;Function &#10;Frequency &#10;Amplitude &#10;Offset &#10;Modulation &#10;c &#10;c &#10;40.4 kHz &#10;c &#10;c &#10;2.5 v &#10;Refer. &#10;Ap &#10;P att. &#10;Sea &#10;-10.15088B ms &#10;4.3708 v &#10;5.75088B ms &#10;DC &#10;3.048002 ms &#10;7.449002 ms &#10;.848002 ms &#10;18.248002 ms &#10;: -10.41 49984 ms &#10;20.848002 ms &#10;t2: 24.8730016 ms ">
             <a:extLst>
               <a:ext uri="{FF2B5EF4-FFF2-40B4-BE49-F238E27FC236}">
-                <a16:creationId xmlns:a16="http://schemas.microsoft.com/office/drawing/2014/main" id="{37864A42-31F6-4BC6-B67F-DF59E0AC20B2}"/>
+                <a16:creationId xmlns:a16="http://schemas.microsoft.com/office/drawing/2014/main" id="{AF0B5932-0659-12E4-3D04-61FC47C2D819}"/>
               </a:ext>
             </a:extLst>
           </p:cNvPr>
@@ -9288,8 +9835,55 @@
         </p:blipFill>
         <p:spPr bwMode="auto">
           <a:xfrm>
-            <a:off x="3343432" y="4014616"/>
-            <a:ext cx="5263671" cy="3217830"/>
+            <a:off x="7777145" y="1540123"/>
+            <a:ext cx="5506636" cy="3059840"/>
+          </a:xfrm>
+          <a:prstGeom prst="rect">
+            <a:avLst/>
+          </a:prstGeom>
+          <a:noFill/>
+          <a:extLst>
+            <a:ext uri="{909E8E84-426E-40DD-AFC4-6F175D3DCCD1}">
+              <a14:hiddenFill xmlns:a14="http://schemas.microsoft.com/office/drawing/2010/main">
+                <a:solidFill>
+                  <a:srgbClr val="FFFFFF"/>
+                </a:solidFill>
+              </a14:hiddenFill>
+            </a:ext>
+          </a:extLst>
+        </p:spPr>
+      </p:pic>
+      <p:pic>
+        <p:nvPicPr>
+          <p:cNvPr id="2052" name="Picture 4">
+            <a:extLst>
+              <a:ext uri="{FF2B5EF4-FFF2-40B4-BE49-F238E27FC236}">
+                <a16:creationId xmlns:a16="http://schemas.microsoft.com/office/drawing/2014/main" id="{0C2D99F3-703B-459E-B17C-D9FF1BF94809}"/>
+              </a:ext>
+            </a:extLst>
+          </p:cNvPr>
+          <p:cNvPicPr>
+            <a:picLocks noChangeAspect="1" noChangeArrowheads="1"/>
+          </p:cNvPicPr>
+          <p:nvPr/>
+        </p:nvPicPr>
+        <p:blipFill>
+          <a:blip r:embed="rId5">
+            <a:extLst>
+              <a:ext uri="{28A0092B-C50C-407E-A947-70E740481C1C}">
+                <a14:useLocalDpi xmlns:a14="http://schemas.microsoft.com/office/drawing/2010/main" val="0"/>
+              </a:ext>
+            </a:extLst>
+          </a:blip>
+          <a:srcRect/>
+          <a:stretch>
+            <a:fillRect/>
+          </a:stretch>
+        </p:blipFill>
+        <p:spPr bwMode="auto">
+          <a:xfrm>
+            <a:off x="3218088" y="1002938"/>
+            <a:ext cx="4739779" cy="2841135"/>
           </a:xfrm>
           <a:prstGeom prst="rect">
             <a:avLst/>
@@ -9367,31 +9961,102 @@
           </a:p>
         </p:txBody>
       </p:sp>
-      <p:sp>
-        <p:nvSpPr>
-          <p:cNvPr id="3" name="Content Placeholder 2">
+      <p:pic>
+        <p:nvPicPr>
+          <p:cNvPr id="2050" name="Picture 2" descr="RTB2004 ; 1333.1005K04 ; 112170 ( 02.202 2018-11-06 ) &#10;2023-04-25 &#10;200 / &#10;Auto &#10;Ru n &#10;12 : 34 &#10;1 MSa/s &#10;High Res. &#10;1 1 .9 V &#10;1 .813 ms &#10;Undo &#10;Delete &#10;zoom &#10;Annotation &#10;Vertical &#10;Trigger &#10;500 &#10;Horizontal &#10;-500 &#10;Measure &#10;813 us &#10;1.013 &#10;1.213 &#10;1.413 &#10;1.613 &#10;813 &#10;2.013 &#10;2.213 &#10;.413 &#10;2.613 &#10;2.813 &#10;VAmp: n/a &#10;tl: 1 .695 ms &#10;t2: 1 .817m , &#10;At: 1 22 &#10;•T: n/a &#10;Vpp : n/a &#10;: 2.0361 V &#10;V2: 24.414 mV &#10;2.0117v &#10;2 Vpp &#10;500 mV/ &#10;Gen &#10;HiglYZ &#10;kHz &#10;Menu ">
             <a:extLst>
               <a:ext uri="{FF2B5EF4-FFF2-40B4-BE49-F238E27FC236}">
-                <a16:creationId xmlns:a16="http://schemas.microsoft.com/office/drawing/2014/main" id="{0EA6CEA5-693D-4A8E-9625-64B415FBC9B2}"/>
+                <a16:creationId xmlns:a16="http://schemas.microsoft.com/office/drawing/2014/main" id="{B3990180-6AA0-DC44-E399-80973C51E8BC}"/>
               </a:ext>
             </a:extLst>
           </p:cNvPr>
-          <p:cNvSpPr>
-            <a:spLocks noGrp="1"/>
-          </p:cNvSpPr>
+          <p:cNvPicPr>
+            <a:picLocks noGrp="1" noChangeAspect="1" noChangeArrowheads="1"/>
+          </p:cNvPicPr>
           <p:nvPr>
             <p:ph idx="1"/>
           </p:nvPr>
-        </p:nvSpPr>
-        <p:spPr/>
-        <p:txBody>
-          <a:bodyPr/>
-          <a:lstStyle/>
-          <a:p>
-            <a:endParaRPr lang="en-GB"/>
-          </a:p>
-        </p:txBody>
-      </p:sp>
+        </p:nvPicPr>
+        <p:blipFill>
+          <a:blip r:embed="rId2">
+            <a:extLst>
+              <a:ext uri="{28A0092B-C50C-407E-A947-70E740481C1C}">
+                <a14:useLocalDpi xmlns:a14="http://schemas.microsoft.com/office/drawing/2010/main" val="0"/>
+              </a:ext>
+            </a:extLst>
+          </a:blip>
+          <a:srcRect/>
+          <a:stretch>
+            <a:fillRect/>
+          </a:stretch>
+        </p:blipFill>
+        <p:spPr bwMode="auto">
+          <a:xfrm>
+            <a:off x="-54799" y="2685661"/>
+            <a:ext cx="6150799" cy="3976396"/>
+          </a:xfrm>
+          <a:prstGeom prst="rect">
+            <a:avLst/>
+          </a:prstGeom>
+          <a:noFill/>
+          <a:extLst>
+            <a:ext uri="{909E8E84-426E-40DD-AFC4-6F175D3DCCD1}">
+              <a14:hiddenFill xmlns:a14="http://schemas.microsoft.com/office/drawing/2010/main">
+                <a:solidFill>
+                  <a:srgbClr val="FFFFFF"/>
+                </a:solidFill>
+              </a14:hiddenFill>
+            </a:ext>
+          </a:extLst>
+        </p:spPr>
+      </p:pic>
+      <p:pic>
+        <p:nvPicPr>
+          <p:cNvPr id="2052" name="Picture 4" descr="RTB2004 ; 1333.1005K04 ; 112170 ( 02.202 2018-11-06 ) &#10;2023-04-25 &#10;200 / &#10;Auto &#10;Ru n &#10;12 : 43 &#10;1 MSa/s &#10;High Res. &#10;1 1 .9 V &#10;2.404 ms &#10;Undo &#10;Delete &#10;zoom &#10;Annotation &#10;800 &#10;600 &#10;Vertical &#10;400 &#10;Trigger &#10;200 &#10;Horizontal &#10;-200 &#10;-400 &#10;-600 &#10;Measure &#10;-800 &#10;1.404 &#10;1.604 &#10;1.804 &#10;2.004 &#10;2.204 &#10;404 &#10;2.604 &#10;2.804 &#10;.004 &#10;3.204 &#10;3.404 &#10;•VAmp: n/a &#10;tl: 2.286m , &#10;t2: 2.408 ms &#10;At: 1 22 &#10;•T: n/a &#10;Vpp : n/a &#10;: 48438 mV &#10;V2: 9.7656 mV &#10;474.61 mV &#10;2 Vpp &#10;200 mV/ &#10;Gen &#10;HiglYZ &#10;kHz &#10;Menu ">
+            <a:extLst>
+              <a:ext uri="{FF2B5EF4-FFF2-40B4-BE49-F238E27FC236}">
+                <a16:creationId xmlns:a16="http://schemas.microsoft.com/office/drawing/2014/main" id="{6CB63D63-E63A-A1ED-20C8-A849E9011153}"/>
+              </a:ext>
+            </a:extLst>
+          </p:cNvPr>
+          <p:cNvPicPr>
+            <a:picLocks noChangeAspect="1" noChangeArrowheads="1"/>
+          </p:cNvPicPr>
+          <p:nvPr/>
+        </p:nvPicPr>
+        <p:blipFill>
+          <a:blip r:embed="rId3">
+            <a:extLst>
+              <a:ext uri="{28A0092B-C50C-407E-A947-70E740481C1C}">
+                <a14:useLocalDpi xmlns:a14="http://schemas.microsoft.com/office/drawing/2010/main" val="0"/>
+              </a:ext>
+            </a:extLst>
+          </a:blip>
+          <a:srcRect/>
+          <a:stretch>
+            <a:fillRect/>
+          </a:stretch>
+        </p:blipFill>
+        <p:spPr bwMode="auto">
+          <a:xfrm>
+            <a:off x="6145763" y="2685661"/>
+            <a:ext cx="6046237" cy="3976396"/>
+          </a:xfrm>
+          <a:prstGeom prst="rect">
+            <a:avLst/>
+          </a:prstGeom>
+          <a:noFill/>
+          <a:extLst>
+            <a:ext uri="{909E8E84-426E-40DD-AFC4-6F175D3DCCD1}">
+              <a14:hiddenFill xmlns:a14="http://schemas.microsoft.com/office/drawing/2010/main">
+                <a:solidFill>
+                  <a:srgbClr val="FFFFFF"/>
+                </a:solidFill>
+              </a14:hiddenFill>
+            </a:ext>
+          </a:extLst>
+        </p:spPr>
+      </p:pic>
     </p:spTree>
     <p:extLst>
       <p:ext uri="{BB962C8B-B14F-4D97-AF65-F5344CB8AC3E}">
@@ -9438,7 +10103,12 @@
             <p:ph type="title"/>
           </p:nvPr>
         </p:nvSpPr>
-        <p:spPr/>
+        <p:spPr>
+          <a:xfrm>
+            <a:off x="-2154628" y="-545841"/>
+            <a:ext cx="10018713" cy="1752599"/>
+          </a:xfrm>
+        </p:spPr>
         <p:txBody>
           <a:bodyPr/>
           <a:lstStyle/>
@@ -9453,28 +10123,263 @@
           </a:p>
         </p:txBody>
       </p:sp>
-      <p:sp>
-        <p:nvSpPr>
-          <p:cNvPr id="3" name="Content Placeholder 2">
+      <p:pic>
+        <p:nvPicPr>
+          <p:cNvPr id="3074" name="Picture 2" descr="20 ms/ &#10;6.019 992 ms &#10;Delete &#10;•VAmp: n/a &#10;Undo &#10;20 v &#10;15 v &#10;10 v &#10;-10 v &#10;-15 v &#10;-20 v &#10;-25 v &#10;02 ms &#10;02 ms &#10;Zoom &#10;Annotation &#10;303 kSa/s &#10;28.02 ms &#10;tl: -6.18 ms &#10;88. &#10;Run &#10;108.02 ms &#10;2023-04_ &#10;48.02 ms &#10;t2: 6.42 ms &#10;88.02 ms &#10;At: 12.6 ms ">
             <a:extLst>
               <a:ext uri="{FF2B5EF4-FFF2-40B4-BE49-F238E27FC236}">
-                <a16:creationId xmlns:a16="http://schemas.microsoft.com/office/drawing/2014/main" id="{26862EAC-32FF-4789-82E1-3780B9BDB14C}"/>
+                <a16:creationId xmlns:a16="http://schemas.microsoft.com/office/drawing/2014/main" id="{836E2338-AB0F-AE00-C91E-20BBBB9F2CEE}"/>
               </a:ext>
             </a:extLst>
           </p:cNvPr>
-          <p:cNvSpPr>
-            <a:spLocks noGrp="1"/>
-          </p:cNvSpPr>
+          <p:cNvPicPr>
+            <a:picLocks noChangeAspect="1" noChangeArrowheads="1"/>
+          </p:cNvPicPr>
+          <p:nvPr/>
+        </p:nvPicPr>
+        <p:blipFill>
+          <a:blip r:embed="rId2">
+            <a:extLst>
+              <a:ext uri="{28A0092B-C50C-407E-A947-70E740481C1C}">
+                <a14:useLocalDpi xmlns:a14="http://schemas.microsoft.com/office/drawing/2010/main" val="0"/>
+              </a:ext>
+            </a:extLst>
+          </a:blip>
+          <a:srcRect/>
+          <a:stretch>
+            <a:fillRect/>
+          </a:stretch>
+        </p:blipFill>
+        <p:spPr bwMode="auto">
+          <a:xfrm>
+            <a:off x="93241" y="963613"/>
+            <a:ext cx="5719665" cy="3368123"/>
+          </a:xfrm>
+          <a:prstGeom prst="rect">
+            <a:avLst/>
+          </a:prstGeom>
+          <a:noFill/>
+          <a:extLst>
+            <a:ext uri="{909E8E84-426E-40DD-AFC4-6F175D3DCCD1}">
+              <a14:hiddenFill xmlns:a14="http://schemas.microsoft.com/office/drawing/2010/main">
+                <a:solidFill>
+                  <a:srgbClr val="FFFFFF"/>
+                </a:solidFill>
+              </a14:hiddenFill>
+            </a:ext>
+          </a:extLst>
+        </p:spPr>
+      </p:pic>
+      <p:pic>
+        <p:nvPicPr>
+          <p:cNvPr id="3076" name="Picture 4">
+            <a:extLst>
+              <a:ext uri="{FF2B5EF4-FFF2-40B4-BE49-F238E27FC236}">
+                <a16:creationId xmlns:a16="http://schemas.microsoft.com/office/drawing/2014/main" id="{594C4740-F95B-2FFE-FFD8-7BD4E78F26F4}"/>
+              </a:ext>
+            </a:extLst>
+          </p:cNvPr>
+          <p:cNvPicPr>
+            <a:picLocks noGrp="1" noChangeAspect="1" noChangeArrowheads="1"/>
+          </p:cNvPicPr>
           <p:nvPr>
             <p:ph idx="1"/>
           </p:nvPr>
-        </p:nvSpPr>
-        <p:spPr/>
-        <p:txBody>
-          <a:bodyPr/>
+        </p:nvPicPr>
+        <p:blipFill>
+          <a:blip r:embed="rId3">
+            <a:extLst>
+              <a:ext uri="{28A0092B-C50C-407E-A947-70E740481C1C}">
+                <a14:useLocalDpi xmlns:a14="http://schemas.microsoft.com/office/drawing/2010/main" val="0"/>
+              </a:ext>
+            </a:extLst>
+          </a:blip>
+          <a:srcRect/>
+          <a:stretch>
+            <a:fillRect/>
+          </a:stretch>
+        </p:blipFill>
+        <p:spPr bwMode="auto">
+          <a:xfrm>
+            <a:off x="93241" y="3733800"/>
+            <a:ext cx="5621319" cy="3124200"/>
+          </a:xfrm>
+          <a:prstGeom prst="rect">
+            <a:avLst/>
+          </a:prstGeom>
+          <a:noFill/>
+          <a:extLst>
+            <a:ext uri="{909E8E84-426E-40DD-AFC4-6F175D3DCCD1}">
+              <a14:hiddenFill xmlns:a14="http://schemas.microsoft.com/office/drawing/2010/main">
+                <a:solidFill>
+                  <a:srgbClr val="FFFFFF"/>
+                </a:solidFill>
+              </a14:hiddenFill>
+            </a:ext>
+          </a:extLst>
+        </p:spPr>
+      </p:pic>
+      <p:sp>
+        <p:nvSpPr>
+          <p:cNvPr id="4" name="TextBox 3">
+            <a:extLst>
+              <a:ext uri="{FF2B5EF4-FFF2-40B4-BE49-F238E27FC236}">
+                <a16:creationId xmlns:a16="http://schemas.microsoft.com/office/drawing/2014/main" id="{D4B4A83C-8928-5C62-30A1-70CA434A7EE6}"/>
+              </a:ext>
+            </a:extLst>
+          </p:cNvPr>
+          <p:cNvSpPr txBox="1"/>
+          <p:nvPr/>
+        </p:nvSpPr>
+        <p:spPr>
+          <a:xfrm>
+            <a:off x="93241" y="594281"/>
+            <a:ext cx="1791478" cy="369332"/>
+          </a:xfrm>
+          <a:prstGeom prst="rect">
+            <a:avLst/>
+          </a:prstGeom>
+          <a:noFill/>
+        </p:spPr>
+        <p:txBody>
+          <a:bodyPr wrap="square" rtlCol="0">
+            <a:spAutoFit/>
+          </a:bodyPr>
           <a:lstStyle/>
           <a:p>
-            <a:endParaRPr lang="en-GB"/>
+            <a:r>
+              <a:rPr lang="en-GB" dirty="0"/>
+              <a:t>Take 1:</a:t>
+            </a:r>
+          </a:p>
+        </p:txBody>
+      </p:sp>
+      <p:pic>
+        <p:nvPicPr>
+          <p:cNvPr id="3078" name="Picture 6" descr="RTB2004; 1333.1005K04; 112170 (02.202 2018-11-06) &#10;Undo &#10;Delete &#10;Zoom &#10;DC &#10;Annotation &#10;-8 ms &#10;Vpp: 610 mV &#10;DC &#10;ms &#10;DC &#10;8 ms &#10;Run &#10;Sample &#10;B ms &#10;2023-05-03 &#10;14:47 &#10;ms &#10;200 &#10;ms &#10;ms &#10;312 MSa/s &#10;4 ms &#10;•vpp: 29.988 V &#10;DC ">
+            <a:extLst>
+              <a:ext uri="{FF2B5EF4-FFF2-40B4-BE49-F238E27FC236}">
+                <a16:creationId xmlns:a16="http://schemas.microsoft.com/office/drawing/2014/main" id="{E07229DA-C9F1-1095-3B5D-8C290B00B78D}"/>
+              </a:ext>
+            </a:extLst>
+          </p:cNvPr>
+          <p:cNvPicPr>
+            <a:picLocks noChangeAspect="1" noChangeArrowheads="1"/>
+          </p:cNvPicPr>
+          <p:nvPr/>
+        </p:nvPicPr>
+        <p:blipFill>
+          <a:blip r:embed="rId4">
+            <a:extLst>
+              <a:ext uri="{28A0092B-C50C-407E-A947-70E740481C1C}">
+                <a14:useLocalDpi xmlns:a14="http://schemas.microsoft.com/office/drawing/2010/main" val="0"/>
+              </a:ext>
+            </a:extLst>
+          </a:blip>
+          <a:srcRect/>
+          <a:stretch>
+            <a:fillRect/>
+          </a:stretch>
+        </p:blipFill>
+        <p:spPr bwMode="auto">
+          <a:xfrm>
+            <a:off x="6621614" y="594281"/>
+            <a:ext cx="5265585" cy="3368123"/>
+          </a:xfrm>
+          <a:prstGeom prst="rect">
+            <a:avLst/>
+          </a:prstGeom>
+          <a:noFill/>
+          <a:extLst>
+            <a:ext uri="{909E8E84-426E-40DD-AFC4-6F175D3DCCD1}">
+              <a14:hiddenFill xmlns:a14="http://schemas.microsoft.com/office/drawing/2010/main">
+                <a:solidFill>
+                  <a:srgbClr val="FFFFFF"/>
+                </a:solidFill>
+              </a14:hiddenFill>
+            </a:ext>
+          </a:extLst>
+        </p:spPr>
+      </p:pic>
+      <p:pic>
+        <p:nvPicPr>
+          <p:cNvPr id="3080" name="Picture 8" descr="v, 150 &#10;DISTANCE ERROR IN US WITH A VARIABLE &#10;REFERENCE VOLTAGE SET AS THE AMPLIFIED &#10;INVERSE OF THE RECTIFIED SIGNAL &#10;DISTANCE (CM) ">
+            <a:extLst>
+              <a:ext uri="{FF2B5EF4-FFF2-40B4-BE49-F238E27FC236}">
+                <a16:creationId xmlns:a16="http://schemas.microsoft.com/office/drawing/2014/main" id="{8424DEAE-362E-3E32-3F8F-3A9DCA270928}"/>
+              </a:ext>
+            </a:extLst>
+          </p:cNvPr>
+          <p:cNvPicPr>
+            <a:picLocks noChangeAspect="1" noChangeArrowheads="1"/>
+          </p:cNvPicPr>
+          <p:nvPr/>
+        </p:nvPicPr>
+        <p:blipFill>
+          <a:blip r:embed="rId5">
+            <a:extLst>
+              <a:ext uri="{28A0092B-C50C-407E-A947-70E740481C1C}">
+                <a14:useLocalDpi xmlns:a14="http://schemas.microsoft.com/office/drawing/2010/main" val="0"/>
+              </a:ext>
+            </a:extLst>
+          </a:blip>
+          <a:srcRect/>
+          <a:stretch>
+            <a:fillRect/>
+          </a:stretch>
+        </p:blipFill>
+        <p:spPr bwMode="auto">
+          <a:xfrm>
+            <a:off x="7017791" y="3633172"/>
+            <a:ext cx="4449532" cy="3236902"/>
+          </a:xfrm>
+          <a:prstGeom prst="rect">
+            <a:avLst/>
+          </a:prstGeom>
+          <a:noFill/>
+          <a:extLst>
+            <a:ext uri="{909E8E84-426E-40DD-AFC4-6F175D3DCCD1}">
+              <a14:hiddenFill xmlns:a14="http://schemas.microsoft.com/office/drawing/2010/main">
+                <a:solidFill>
+                  <a:srgbClr val="FFFFFF"/>
+                </a:solidFill>
+              </a14:hiddenFill>
+            </a:ext>
+          </a:extLst>
+        </p:spPr>
+      </p:pic>
+      <p:sp>
+        <p:nvSpPr>
+          <p:cNvPr id="5" name="TextBox 4">
+            <a:extLst>
+              <a:ext uri="{FF2B5EF4-FFF2-40B4-BE49-F238E27FC236}">
+                <a16:creationId xmlns:a16="http://schemas.microsoft.com/office/drawing/2014/main" id="{70E6C772-049F-6BAC-C7EC-68425797814B}"/>
+              </a:ext>
+            </a:extLst>
+          </p:cNvPr>
+          <p:cNvSpPr txBox="1"/>
+          <p:nvPr/>
+        </p:nvSpPr>
+        <p:spPr>
+          <a:xfrm>
+            <a:off x="6621614" y="224949"/>
+            <a:ext cx="1548881" cy="369332"/>
+          </a:xfrm>
+          <a:prstGeom prst="rect">
+            <a:avLst/>
+          </a:prstGeom>
+          <a:noFill/>
+        </p:spPr>
+        <p:txBody>
+          <a:bodyPr wrap="square" rtlCol="0">
+            <a:spAutoFit/>
+          </a:bodyPr>
+          <a:lstStyle/>
+          <a:p>
+            <a:r>
+              <a:rPr lang="en-GB" dirty="0"/>
+              <a:t>Take 2:</a:t>
+            </a:r>
           </a:p>
         </p:txBody>
       </p:sp>
@@ -9524,7 +10429,12 @@
             <p:ph type="title"/>
           </p:nvPr>
         </p:nvSpPr>
-        <p:spPr/>
+        <p:spPr>
+          <a:xfrm>
+            <a:off x="-2443876" y="5351107"/>
+            <a:ext cx="10018713" cy="1752599"/>
+          </a:xfrm>
+        </p:spPr>
         <p:txBody>
           <a:bodyPr/>
           <a:lstStyle/>
@@ -9539,31 +10449,98 @@
           </a:p>
         </p:txBody>
       </p:sp>
-      <p:sp>
-        <p:nvSpPr>
-          <p:cNvPr id="3" name="Content Placeholder 2">
+      <p:pic>
+        <p:nvPicPr>
+          <p:cNvPr id="4" name="Picture 3" descr="A picture containing line, plot, diagram, parallel&#10;&#10;Description automatically generated">
             <a:extLst>
               <a:ext uri="{FF2B5EF4-FFF2-40B4-BE49-F238E27FC236}">
-                <a16:creationId xmlns:a16="http://schemas.microsoft.com/office/drawing/2014/main" id="{AA3AB843-E61C-4DAF-BEB5-E3E77ACD7AAA}"/>
+                <a16:creationId xmlns:a16="http://schemas.microsoft.com/office/drawing/2014/main" id="{775DB98F-6D0C-A26D-2254-DACCD75A148B}"/>
               </a:ext>
             </a:extLst>
           </p:cNvPr>
-          <p:cNvSpPr>
-            <a:spLocks noGrp="1"/>
-          </p:cNvSpPr>
+          <p:cNvPicPr>
+            <a:picLocks noChangeAspect="1"/>
+          </p:cNvPicPr>
+          <p:nvPr/>
+        </p:nvPicPr>
+        <p:blipFill>
+          <a:blip r:embed="rId2"/>
+          <a:stretch>
+            <a:fillRect/>
+          </a:stretch>
+        </p:blipFill>
+        <p:spPr>
+          <a:xfrm>
+            <a:off x="4945225" y="67456"/>
+            <a:ext cx="7118838" cy="3112150"/>
+          </a:xfrm>
+          <a:prstGeom prst="rect">
+            <a:avLst/>
+          </a:prstGeom>
+        </p:spPr>
+      </p:pic>
+      <p:pic>
+        <p:nvPicPr>
+          <p:cNvPr id="5" name="Content Placeholder 4" descr="A picture containing text, screenshot, font&#10;&#10;Description automatically generated">
+            <a:extLst>
+              <a:ext uri="{FF2B5EF4-FFF2-40B4-BE49-F238E27FC236}">
+                <a16:creationId xmlns:a16="http://schemas.microsoft.com/office/drawing/2014/main" id="{6925C46B-A769-F571-0887-95964594FFAF}"/>
+              </a:ext>
+            </a:extLst>
+          </p:cNvPr>
+          <p:cNvPicPr>
+            <a:picLocks noGrp="1" noChangeAspect="1"/>
+          </p:cNvPicPr>
           <p:nvPr>
             <p:ph idx="1"/>
           </p:nvPr>
-        </p:nvSpPr>
-        <p:spPr/>
-        <p:txBody>
-          <a:bodyPr/>
-          <a:lstStyle/>
-          <a:p>
-            <a:endParaRPr lang="en-GB"/>
-          </a:p>
-        </p:txBody>
-      </p:sp>
+        </p:nvPicPr>
+        <p:blipFill>
+          <a:blip r:embed="rId3"/>
+          <a:stretch>
+            <a:fillRect/>
+          </a:stretch>
+        </p:blipFill>
+        <p:spPr>
+          <a:xfrm>
+            <a:off x="0" y="539308"/>
+            <a:ext cx="4736832" cy="4135329"/>
+          </a:xfrm>
+          <a:prstGeom prst="rect">
+            <a:avLst/>
+          </a:prstGeom>
+        </p:spPr>
+      </p:pic>
+      <p:pic>
+        <p:nvPicPr>
+          <p:cNvPr id="7" name="Picture 6">
+            <a:extLst>
+              <a:ext uri="{FF2B5EF4-FFF2-40B4-BE49-F238E27FC236}">
+                <a16:creationId xmlns:a16="http://schemas.microsoft.com/office/drawing/2014/main" id="{68F5B8A5-585A-295F-B8CF-DAABAC6B011F}"/>
+              </a:ext>
+            </a:extLst>
+          </p:cNvPr>
+          <p:cNvPicPr>
+            <a:picLocks noChangeAspect="1"/>
+          </p:cNvPicPr>
+          <p:nvPr/>
+        </p:nvPicPr>
+        <p:blipFill>
+          <a:blip r:embed="rId4"/>
+          <a:stretch>
+            <a:fillRect/>
+          </a:stretch>
+        </p:blipFill>
+        <p:spPr>
+          <a:xfrm>
+            <a:off x="5171583" y="3365232"/>
+            <a:ext cx="6892480" cy="3425312"/>
+          </a:xfrm>
+          <a:prstGeom prst="rect">
+            <a:avLst/>
+          </a:prstGeom>
+        </p:spPr>
+      </p:pic>
     </p:spTree>
     <p:extLst>
       <p:ext uri="{BB962C8B-B14F-4D97-AF65-F5344CB8AC3E}">
@@ -9610,7 +10587,12 @@
             <p:ph type="title"/>
           </p:nvPr>
         </p:nvSpPr>
-        <p:spPr/>
+        <p:spPr>
+          <a:xfrm>
+            <a:off x="1484310" y="116633"/>
+            <a:ext cx="10018713" cy="1752599"/>
+          </a:xfrm>
+        </p:spPr>
         <p:txBody>
           <a:bodyPr/>
           <a:lstStyle/>
@@ -9625,31 +10607,120 @@
           </a:p>
         </p:txBody>
       </p:sp>
-      <p:sp>
-        <p:nvSpPr>
-          <p:cNvPr id="3" name="Content Placeholder 2">
+      <p:pic>
+        <p:nvPicPr>
+          <p:cNvPr id="4" name="Picture 3" descr="A picture containing font, text, line, white&#10;&#10;Description automatically generated">
             <a:extLst>
               <a:ext uri="{FF2B5EF4-FFF2-40B4-BE49-F238E27FC236}">
-                <a16:creationId xmlns:a16="http://schemas.microsoft.com/office/drawing/2014/main" id="{96E61FFC-E49C-47BB-A112-6976A28FE855}"/>
+                <a16:creationId xmlns:a16="http://schemas.microsoft.com/office/drawing/2014/main" id="{EE40A98A-4B1C-CA4A-0E52-E8C875F9433C}"/>
               </a:ext>
             </a:extLst>
           </p:cNvPr>
-          <p:cNvSpPr>
-            <a:spLocks noGrp="1"/>
-          </p:cNvSpPr>
+          <p:cNvPicPr>
+            <a:picLocks noChangeAspect="1"/>
+          </p:cNvPicPr>
+          <p:nvPr/>
+        </p:nvPicPr>
+        <p:blipFill>
+          <a:blip r:embed="rId2">
+            <a:extLst>
+              <a:ext uri="{28A0092B-C50C-407E-A947-70E740481C1C}">
+                <a14:useLocalDpi xmlns:a14="http://schemas.microsoft.com/office/drawing/2010/main" val="0"/>
+              </a:ext>
+            </a:extLst>
+          </a:blip>
+          <a:srcRect/>
+          <a:stretch>
+            <a:fillRect/>
+          </a:stretch>
+        </p:blipFill>
+        <p:spPr bwMode="auto">
+          <a:xfrm>
+            <a:off x="208172" y="1557463"/>
+            <a:ext cx="4385158" cy="1309337"/>
+          </a:xfrm>
+          <a:prstGeom prst="rect">
+            <a:avLst/>
+          </a:prstGeom>
+          <a:noFill/>
+          <a:ln>
+            <a:noFill/>
+          </a:ln>
+        </p:spPr>
+      </p:pic>
+      <p:pic>
+        <p:nvPicPr>
+          <p:cNvPr id="5" name="Content Placeholder 4" descr="A screen shot of a computer code&#10;&#10;Description automatically generated with low confidence">
+            <a:extLst>
+              <a:ext uri="{FF2B5EF4-FFF2-40B4-BE49-F238E27FC236}">
+                <a16:creationId xmlns:a16="http://schemas.microsoft.com/office/drawing/2014/main" id="{A11A560F-0D7B-141F-5C43-01011A7FFA99}"/>
+              </a:ext>
+            </a:extLst>
+          </p:cNvPr>
+          <p:cNvPicPr>
+            <a:picLocks noGrp="1" noChangeAspect="1"/>
+          </p:cNvPicPr>
           <p:nvPr>
             <p:ph idx="1"/>
           </p:nvPr>
-        </p:nvSpPr>
-        <p:spPr/>
-        <p:txBody>
-          <a:bodyPr/>
-          <a:lstStyle/>
-          <a:p>
-            <a:endParaRPr lang="en-GB" dirty="0"/>
-          </a:p>
-        </p:txBody>
-      </p:sp>
+        </p:nvPicPr>
+        <p:blipFill>
+          <a:blip r:embed="rId3"/>
+          <a:stretch>
+            <a:fillRect/>
+          </a:stretch>
+        </p:blipFill>
+        <p:spPr>
+          <a:xfrm>
+            <a:off x="208172" y="3007292"/>
+            <a:ext cx="5125165" cy="1981477"/>
+          </a:xfrm>
+          <a:prstGeom prst="rect">
+            <a:avLst/>
+          </a:prstGeom>
+        </p:spPr>
+      </p:pic>
+      <p:pic>
+        <p:nvPicPr>
+          <p:cNvPr id="6" name="Picture 5" descr="speed = 345.242981 &#10;distance = &#10;o .047861 &#10;tine = &#10;277.362610 &#10;temp = 24 &#10;speed = 345.242981 &#10;distance = &#10;o. 047879 &#10;tine = &#10;277.453613 &#10;temp = 24 &#10;speed = 345.242981 &#10;distance = &#10;o. 047894 &#10;tine = &#10;temp = &#10;277.544556 &#10;24 ">
+            <a:extLst>
+              <a:ext uri="{FF2B5EF4-FFF2-40B4-BE49-F238E27FC236}">
+                <a16:creationId xmlns:a16="http://schemas.microsoft.com/office/drawing/2014/main" id="{E91B0646-A8AE-79A3-0283-874DC4416F68}"/>
+              </a:ext>
+            </a:extLst>
+          </p:cNvPr>
+          <p:cNvPicPr>
+            <a:picLocks noChangeAspect="1"/>
+          </p:cNvPicPr>
+          <p:nvPr/>
+        </p:nvPicPr>
+        <p:blipFill>
+          <a:blip r:embed="rId4">
+            <a:extLst>
+              <a:ext uri="{28A0092B-C50C-407E-A947-70E740481C1C}">
+                <a14:useLocalDpi xmlns:a14="http://schemas.microsoft.com/office/drawing/2010/main" val="0"/>
+              </a:ext>
+            </a:extLst>
+          </a:blip>
+          <a:srcRect/>
+          <a:stretch>
+            <a:fillRect/>
+          </a:stretch>
+        </p:blipFill>
+        <p:spPr bwMode="auto">
+          <a:xfrm>
+            <a:off x="7785985" y="2095807"/>
+            <a:ext cx="2656841" cy="3092013"/>
+          </a:xfrm>
+          <a:prstGeom prst="rect">
+            <a:avLst/>
+          </a:prstGeom>
+          <a:noFill/>
+          <a:ln>
+            <a:noFill/>
+          </a:ln>
+        </p:spPr>
+      </p:pic>
     </p:spTree>
     <p:extLst>
       <p:ext uri="{BB962C8B-B14F-4D97-AF65-F5344CB8AC3E}">
@@ -9752,6 +10823,367 @@
           </a:p>
         </p:txBody>
       </p:sp>
+      <p:pic>
+        <p:nvPicPr>
+          <p:cNvPr id="4" name="Picture 3" descr="A picture containing text, handwriting, ink&#10;&#10;Description automatically generated">
+            <a:extLst>
+              <a:ext uri="{FF2B5EF4-FFF2-40B4-BE49-F238E27FC236}">
+                <a16:creationId xmlns:a16="http://schemas.microsoft.com/office/drawing/2014/main" id="{4C9BB396-F72B-E596-AEEB-A1A6460095A2}"/>
+              </a:ext>
+            </a:extLst>
+          </p:cNvPr>
+          <p:cNvPicPr>
+            <a:picLocks noChangeAspect="1"/>
+          </p:cNvPicPr>
+          <p:nvPr/>
+        </p:nvPicPr>
+        <p:blipFill rotWithShape="1">
+          <a:blip r:embed="rId2">
+            <a:extLst>
+              <a:ext uri="{28A0092B-C50C-407E-A947-70E740481C1C}">
+                <a14:useLocalDpi xmlns:a14="http://schemas.microsoft.com/office/drawing/2010/main" val="0"/>
+              </a:ext>
+            </a:extLst>
+          </a:blip>
+          <a:srcRect t="1720"/>
+          <a:stretch/>
+        </p:blipFill>
+        <p:spPr bwMode="auto">
+          <a:xfrm>
+            <a:off x="171062" y="3298973"/>
+            <a:ext cx="3982718" cy="2649293"/>
+          </a:xfrm>
+          <a:prstGeom prst="rect">
+            <a:avLst/>
+          </a:prstGeom>
+          <a:ln>
+            <a:noFill/>
+          </a:ln>
+          <a:extLst>
+            <a:ext uri="{53640926-AAD7-44D8-BBD7-CCE9431645EC}">
+              <a14:shadowObscured xmlns:a14="http://schemas.microsoft.com/office/drawing/2010/main"/>
+            </a:ext>
+          </a:extLst>
+        </p:spPr>
+      </p:pic>
+      <p:pic>
+        <p:nvPicPr>
+          <p:cNvPr id="6" name="Picture 5">
+            <a:extLst>
+              <a:ext uri="{FF2B5EF4-FFF2-40B4-BE49-F238E27FC236}">
+                <a16:creationId xmlns:a16="http://schemas.microsoft.com/office/drawing/2014/main" id="{F6FD4C69-3C2F-2763-C0D6-1CE2B3768152}"/>
+              </a:ext>
+            </a:extLst>
+          </p:cNvPr>
+          <p:cNvPicPr>
+            <a:picLocks noChangeAspect="1"/>
+          </p:cNvPicPr>
+          <p:nvPr/>
+        </p:nvPicPr>
+        <p:blipFill>
+          <a:blip r:embed="rId3"/>
+          <a:stretch>
+            <a:fillRect/>
+          </a:stretch>
+        </p:blipFill>
+        <p:spPr>
+          <a:xfrm>
+            <a:off x="4395550" y="3208959"/>
+            <a:ext cx="3400900" cy="2829320"/>
+          </a:xfrm>
+          <a:prstGeom prst="rect">
+            <a:avLst/>
+          </a:prstGeom>
+        </p:spPr>
+      </p:pic>
+      <p:pic>
+        <p:nvPicPr>
+          <p:cNvPr id="7" name="Picture 6">
+            <a:extLst>
+              <a:ext uri="{FF2B5EF4-FFF2-40B4-BE49-F238E27FC236}">
+                <a16:creationId xmlns:a16="http://schemas.microsoft.com/office/drawing/2014/main" id="{71D7AC95-0C8F-8E55-3FC8-96BA66D6FEB7}"/>
+              </a:ext>
+            </a:extLst>
+          </p:cNvPr>
+          <p:cNvPicPr>
+            <a:picLocks noChangeAspect="1"/>
+          </p:cNvPicPr>
+          <p:nvPr/>
+        </p:nvPicPr>
+        <p:blipFill>
+          <a:blip r:embed="rId4">
+            <a:extLst>
+              <a:ext uri="{28A0092B-C50C-407E-A947-70E740481C1C}">
+                <a14:useLocalDpi xmlns:a14="http://schemas.microsoft.com/office/drawing/2010/main" val="0"/>
+              </a:ext>
+            </a:extLst>
+          </a:blip>
+          <a:stretch>
+            <a:fillRect/>
+          </a:stretch>
+        </p:blipFill>
+        <p:spPr>
+          <a:xfrm>
+            <a:off x="8815397" y="1678"/>
+            <a:ext cx="1419860" cy="1553845"/>
+          </a:xfrm>
+          <a:prstGeom prst="rect">
+            <a:avLst/>
+          </a:prstGeom>
+        </p:spPr>
+      </p:pic>
+      <p:pic>
+        <p:nvPicPr>
+          <p:cNvPr id="8" name="Picture 7">
+            <a:extLst>
+              <a:ext uri="{FF2B5EF4-FFF2-40B4-BE49-F238E27FC236}">
+                <a16:creationId xmlns:a16="http://schemas.microsoft.com/office/drawing/2014/main" id="{31E4AB79-6783-AED3-3F94-8DBB398B993A}"/>
+              </a:ext>
+            </a:extLst>
+          </p:cNvPr>
+          <p:cNvPicPr>
+            <a:picLocks noChangeAspect="1"/>
+          </p:cNvPicPr>
+          <p:nvPr/>
+        </p:nvPicPr>
+        <p:blipFill>
+          <a:blip r:embed="rId4">
+            <a:extLst>
+              <a:ext uri="{28A0092B-C50C-407E-A947-70E740481C1C}">
+                <a14:useLocalDpi xmlns:a14="http://schemas.microsoft.com/office/drawing/2010/main" val="0"/>
+              </a:ext>
+            </a:extLst>
+          </a:blip>
+          <a:stretch>
+            <a:fillRect/>
+          </a:stretch>
+        </p:blipFill>
+        <p:spPr>
+          <a:xfrm>
+            <a:off x="10196706" y="0"/>
+            <a:ext cx="1419860" cy="1553845"/>
+          </a:xfrm>
+          <a:prstGeom prst="rect">
+            <a:avLst/>
+          </a:prstGeom>
+        </p:spPr>
+      </p:pic>
+      <p:pic>
+        <p:nvPicPr>
+          <p:cNvPr id="9" name="Picture 8">
+            <a:extLst>
+              <a:ext uri="{FF2B5EF4-FFF2-40B4-BE49-F238E27FC236}">
+                <a16:creationId xmlns:a16="http://schemas.microsoft.com/office/drawing/2014/main" id="{24A5E2FD-D04E-EA2D-46D9-6C53DD970FCA}"/>
+              </a:ext>
+            </a:extLst>
+          </p:cNvPr>
+          <p:cNvPicPr>
+            <a:picLocks noChangeAspect="1"/>
+          </p:cNvPicPr>
+          <p:nvPr/>
+        </p:nvPicPr>
+        <p:blipFill>
+          <a:blip r:embed="rId4">
+            <a:extLst>
+              <a:ext uri="{28A0092B-C50C-407E-A947-70E740481C1C}">
+                <a14:useLocalDpi xmlns:a14="http://schemas.microsoft.com/office/drawing/2010/main" val="0"/>
+              </a:ext>
+            </a:extLst>
+          </a:blip>
+          <a:stretch>
+            <a:fillRect/>
+          </a:stretch>
+        </p:blipFill>
+        <p:spPr>
+          <a:xfrm>
+            <a:off x="8853947" y="1116086"/>
+            <a:ext cx="1419860" cy="1553845"/>
+          </a:xfrm>
+          <a:prstGeom prst="rect">
+            <a:avLst/>
+          </a:prstGeom>
+        </p:spPr>
+      </p:pic>
+      <p:pic>
+        <p:nvPicPr>
+          <p:cNvPr id="10" name="Picture 9">
+            <a:extLst>
+              <a:ext uri="{FF2B5EF4-FFF2-40B4-BE49-F238E27FC236}">
+                <a16:creationId xmlns:a16="http://schemas.microsoft.com/office/drawing/2014/main" id="{EC53E117-C496-2E09-A9E3-5E6210F73EF5}"/>
+              </a:ext>
+            </a:extLst>
+          </p:cNvPr>
+          <p:cNvPicPr>
+            <a:picLocks noChangeAspect="1"/>
+          </p:cNvPicPr>
+          <p:nvPr/>
+        </p:nvPicPr>
+        <p:blipFill>
+          <a:blip r:embed="rId4">
+            <a:extLst>
+              <a:ext uri="{28A0092B-C50C-407E-A947-70E740481C1C}">
+                <a14:useLocalDpi xmlns:a14="http://schemas.microsoft.com/office/drawing/2010/main" val="0"/>
+              </a:ext>
+            </a:extLst>
+          </a:blip>
+          <a:stretch>
+            <a:fillRect/>
+          </a:stretch>
+        </p:blipFill>
+        <p:spPr>
+          <a:xfrm>
+            <a:off x="10273807" y="1075858"/>
+            <a:ext cx="1419860" cy="1553845"/>
+          </a:xfrm>
+          <a:prstGeom prst="rect">
+            <a:avLst/>
+          </a:prstGeom>
+        </p:spPr>
+      </p:pic>
+      <p:pic>
+        <p:nvPicPr>
+          <p:cNvPr id="11" name="Picture 10">
+            <a:extLst>
+              <a:ext uri="{FF2B5EF4-FFF2-40B4-BE49-F238E27FC236}">
+                <a16:creationId xmlns:a16="http://schemas.microsoft.com/office/drawing/2014/main" id="{65FDE206-FC38-A056-8D50-EAF8B10B3FCD}"/>
+              </a:ext>
+            </a:extLst>
+          </p:cNvPr>
+          <p:cNvPicPr>
+            <a:picLocks noChangeAspect="1"/>
+          </p:cNvPicPr>
+          <p:nvPr/>
+        </p:nvPicPr>
+        <p:blipFill>
+          <a:blip r:embed="rId4">
+            <a:extLst>
+              <a:ext uri="{28A0092B-C50C-407E-A947-70E740481C1C}">
+                <a14:useLocalDpi xmlns:a14="http://schemas.microsoft.com/office/drawing/2010/main" val="0"/>
+              </a:ext>
+            </a:extLst>
+          </a:blip>
+          <a:stretch>
+            <a:fillRect/>
+          </a:stretch>
+        </p:blipFill>
+        <p:spPr>
+          <a:xfrm>
+            <a:off x="8776846" y="3685736"/>
+            <a:ext cx="1419860" cy="1553845"/>
+          </a:xfrm>
+          <a:prstGeom prst="rect">
+            <a:avLst/>
+          </a:prstGeom>
+        </p:spPr>
+      </p:pic>
+      <p:pic>
+        <p:nvPicPr>
+          <p:cNvPr id="12" name="Picture 11">
+            <a:extLst>
+              <a:ext uri="{FF2B5EF4-FFF2-40B4-BE49-F238E27FC236}">
+                <a16:creationId xmlns:a16="http://schemas.microsoft.com/office/drawing/2014/main" id="{4DA9C7BA-A218-29A7-2726-D12932DBA6E2}"/>
+              </a:ext>
+            </a:extLst>
+          </p:cNvPr>
+          <p:cNvPicPr>
+            <a:picLocks noChangeAspect="1"/>
+          </p:cNvPicPr>
+          <p:nvPr/>
+        </p:nvPicPr>
+        <p:blipFill>
+          <a:blip r:embed="rId4">
+            <a:extLst>
+              <a:ext uri="{28A0092B-C50C-407E-A947-70E740481C1C}">
+                <a14:useLocalDpi xmlns:a14="http://schemas.microsoft.com/office/drawing/2010/main" val="0"/>
+              </a:ext>
+            </a:extLst>
+          </a:blip>
+          <a:stretch>
+            <a:fillRect/>
+          </a:stretch>
+        </p:blipFill>
+        <p:spPr>
+          <a:xfrm>
+            <a:off x="8853947" y="4863100"/>
+            <a:ext cx="1419860" cy="1553845"/>
+          </a:xfrm>
+          <a:prstGeom prst="rect">
+            <a:avLst/>
+          </a:prstGeom>
+        </p:spPr>
+      </p:pic>
+      <p:pic>
+        <p:nvPicPr>
+          <p:cNvPr id="14" name="Picture 13">
+            <a:extLst>
+              <a:ext uri="{FF2B5EF4-FFF2-40B4-BE49-F238E27FC236}">
+                <a16:creationId xmlns:a16="http://schemas.microsoft.com/office/drawing/2014/main" id="{0AF3FEE2-211F-527C-AC49-5BEC42584B6B}"/>
+              </a:ext>
+            </a:extLst>
+          </p:cNvPr>
+          <p:cNvPicPr>
+            <a:picLocks noChangeAspect="1"/>
+          </p:cNvPicPr>
+          <p:nvPr/>
+        </p:nvPicPr>
+        <p:blipFill>
+          <a:blip r:embed="rId4">
+            <a:extLst>
+              <a:ext uri="{28A0092B-C50C-407E-A947-70E740481C1C}">
+                <a14:useLocalDpi xmlns:a14="http://schemas.microsoft.com/office/drawing/2010/main" val="0"/>
+              </a:ext>
+            </a:extLst>
+          </a:blip>
+          <a:stretch>
+            <a:fillRect/>
+          </a:stretch>
+        </p:blipFill>
+        <p:spPr>
+          <a:xfrm>
+            <a:off x="10163099" y="3645508"/>
+            <a:ext cx="1419860" cy="1553845"/>
+          </a:xfrm>
+          <a:prstGeom prst="rect">
+            <a:avLst/>
+          </a:prstGeom>
+        </p:spPr>
+      </p:pic>
+      <p:pic>
+        <p:nvPicPr>
+          <p:cNvPr id="13" name="Picture 12">
+            <a:extLst>
+              <a:ext uri="{FF2B5EF4-FFF2-40B4-BE49-F238E27FC236}">
+                <a16:creationId xmlns:a16="http://schemas.microsoft.com/office/drawing/2014/main" id="{CF80BC39-4310-07D3-6DD4-22F270B1439A}"/>
+              </a:ext>
+            </a:extLst>
+          </p:cNvPr>
+          <p:cNvPicPr>
+            <a:picLocks noChangeAspect="1"/>
+          </p:cNvPicPr>
+          <p:nvPr/>
+        </p:nvPicPr>
+        <p:blipFill>
+          <a:blip r:embed="rId4">
+            <a:extLst>
+              <a:ext uri="{28A0092B-C50C-407E-A947-70E740481C1C}">
+                <a14:useLocalDpi xmlns:a14="http://schemas.microsoft.com/office/drawing/2010/main" val="0"/>
+              </a:ext>
+            </a:extLst>
+          </a:blip>
+          <a:stretch>
+            <a:fillRect/>
+          </a:stretch>
+        </p:blipFill>
+        <p:spPr>
+          <a:xfrm>
+            <a:off x="10163099" y="4908854"/>
+            <a:ext cx="1419860" cy="1553845"/>
+          </a:xfrm>
+          <a:prstGeom prst="rect">
+            <a:avLst/>
+          </a:prstGeom>
+        </p:spPr>
+      </p:pic>
     </p:spTree>
     <p:extLst>
       <p:ext uri="{BB962C8B-B14F-4D97-AF65-F5344CB8AC3E}">

</xml_diff>